<commit_message>
Generating text to image
</commit_message>
<xml_diff>
--- a/graphics-design/number-labels.pptx
+++ b/graphics-design/number-labels.pptx
@@ -2,7 +2,7 @@
 <file path=ppt/presentation.xml><?xml version="1.0" encoding="utf-8"?>
 <p:presentation xmlns:a="http://schemas.openxmlformats.org/drawingml/2006/main" xmlns:r="http://schemas.openxmlformats.org/officeDocument/2006/relationships" xmlns:p="http://schemas.openxmlformats.org/presentationml/2006/main" saveSubsetFonts="1">
   <p:sldMasterIdLst>
-    <p:sldMasterId id="2147483720" r:id="rId1"/>
+    <p:sldMasterId id="2147483732" r:id="rId1"/>
   </p:sldMasterIdLst>
   <p:sldIdLst>
     <p:sldId id="256" r:id="rId2"/>
@@ -13,7 +13,7 @@
     <p:sldId id="262" r:id="rId7"/>
     <p:sldId id="263" r:id="rId8"/>
   </p:sldIdLst>
-  <p:sldSz cx="5562600" cy="914400"/>
+  <p:sldSz cx="5562600" cy="1096963"/>
   <p:notesSz cx="9144000" cy="6858000"/>
   <p:defaultTextStyle>
     <a:defPPr>
@@ -110,6 +110,11 @@
       </a:defRPr>
     </a:lvl9pPr>
   </p:defaultTextStyle>
+  <p:extLst>
+    <p:ext uri="{EFAFB233-063F-42B5-8137-9DF3F51BA10A}">
+      <p15:sldGuideLst xmlns:p15="http://schemas.microsoft.com/office/powerpoint/2012/main"/>
+    </p:ext>
+  </p:extLst>
 </p:presentation>
 </file>
 
@@ -142,15 +147,15 @@
         </p:nvSpPr>
         <p:spPr>
           <a:xfrm>
-            <a:off x="695325" y="149648"/>
-            <a:ext cx="4171950" cy="318347"/>
+            <a:off x="695325" y="179526"/>
+            <a:ext cx="4171950" cy="381906"/>
           </a:xfrm>
         </p:spPr>
         <p:txBody>
           <a:bodyPr anchor="b"/>
           <a:lstStyle>
             <a:lvl1pPr algn="ctr">
-              <a:defRPr sz="800"/>
+              <a:defRPr sz="960"/>
             </a:lvl1pPr>
           </a:lstStyle>
           <a:p>
@@ -174,8 +179,8 @@
         </p:nvSpPr>
         <p:spPr>
           <a:xfrm>
-            <a:off x="695325" y="480272"/>
-            <a:ext cx="4171950" cy="220768"/>
+            <a:off x="695325" y="576160"/>
+            <a:ext cx="4171950" cy="264845"/>
           </a:xfrm>
         </p:spPr>
         <p:txBody>
@@ -183,39 +188,39 @@
           <a:lstStyle>
             <a:lvl1pPr marL="0" indent="0" algn="ctr">
               <a:buNone/>
+              <a:defRPr sz="384"/>
+            </a:lvl1pPr>
+            <a:lvl2pPr marL="73152" indent="0" algn="ctr">
+              <a:buNone/>
               <a:defRPr sz="320"/>
-            </a:lvl1pPr>
-            <a:lvl2pPr marL="60945" indent="0" algn="ctr">
-              <a:buNone/>
-              <a:defRPr sz="267"/>
             </a:lvl2pPr>
-            <a:lvl3pPr marL="121890" indent="0" algn="ctr">
-              <a:buNone/>
-              <a:defRPr sz="240"/>
+            <a:lvl3pPr marL="146304" indent="0" algn="ctr">
+              <a:buNone/>
+              <a:defRPr sz="288"/>
             </a:lvl3pPr>
-            <a:lvl4pPr marL="182834" indent="0" algn="ctr">
-              <a:buNone/>
-              <a:defRPr sz="213"/>
+            <a:lvl4pPr marL="219456" indent="0" algn="ctr">
+              <a:buNone/>
+              <a:defRPr sz="256"/>
             </a:lvl4pPr>
-            <a:lvl5pPr marL="243779" indent="0" algn="ctr">
-              <a:buNone/>
-              <a:defRPr sz="213"/>
+            <a:lvl5pPr marL="292608" indent="0" algn="ctr">
+              <a:buNone/>
+              <a:defRPr sz="256"/>
             </a:lvl5pPr>
-            <a:lvl6pPr marL="304724" indent="0" algn="ctr">
-              <a:buNone/>
-              <a:defRPr sz="213"/>
+            <a:lvl6pPr marL="365760" indent="0" algn="ctr">
+              <a:buNone/>
+              <a:defRPr sz="256"/>
             </a:lvl6pPr>
-            <a:lvl7pPr marL="365669" indent="0" algn="ctr">
-              <a:buNone/>
-              <a:defRPr sz="213"/>
+            <a:lvl7pPr marL="438912" indent="0" algn="ctr">
+              <a:buNone/>
+              <a:defRPr sz="256"/>
             </a:lvl7pPr>
-            <a:lvl8pPr marL="426613" indent="0" algn="ctr">
-              <a:buNone/>
-              <a:defRPr sz="213"/>
+            <a:lvl8pPr marL="512064" indent="0" algn="ctr">
+              <a:buNone/>
+              <a:defRPr sz="256"/>
             </a:lvl8pPr>
-            <a:lvl9pPr marL="487558" indent="0" algn="ctr">
-              <a:buNone/>
-              <a:defRPr sz="213"/>
+            <a:lvl9pPr marL="585216" indent="0" algn="ctr">
+              <a:buNone/>
+              <a:defRPr sz="256"/>
             </a:lvl9pPr>
           </a:lstStyle>
           <a:p>
@@ -244,7 +249,7 @@
           <a:p>
             <a:fld id="{2D9AFD49-2911-40A0-8C34-1C3909DA5CA6}" type="datetimeFigureOut">
               <a:rPr lang="en-US" smtClean="0"/>
-              <a:t>6/4/2020</a:t>
+              <a:t>6/5/2020</a:t>
             </a:fld>
             <a:endParaRPr lang="en-US"/>
           </a:p>
@@ -295,7 +300,7 @@
     </p:spTree>
     <p:extLst>
       <p:ext uri="{BB962C8B-B14F-4D97-AF65-F5344CB8AC3E}">
-        <p14:creationId xmlns:p14="http://schemas.microsoft.com/office/powerpoint/2010/main" val="1213055926"/>
+        <p14:creationId xmlns:p14="http://schemas.microsoft.com/office/powerpoint/2010/main" val="623874301"/>
       </p:ext>
     </p:extLst>
   </p:cSld>
@@ -414,7 +419,7 @@
           <a:p>
             <a:fld id="{2D9AFD49-2911-40A0-8C34-1C3909DA5CA6}" type="datetimeFigureOut">
               <a:rPr lang="en-US" smtClean="0"/>
-              <a:t>6/4/2020</a:t>
+              <a:t>6/5/2020</a:t>
             </a:fld>
             <a:endParaRPr lang="en-US"/>
           </a:p>
@@ -465,7 +470,7 @@
     </p:spTree>
     <p:extLst>
       <p:ext uri="{BB962C8B-B14F-4D97-AF65-F5344CB8AC3E}">
-        <p14:creationId xmlns:p14="http://schemas.microsoft.com/office/powerpoint/2010/main" val="657994484"/>
+        <p14:creationId xmlns:p14="http://schemas.microsoft.com/office/powerpoint/2010/main" val="16900311"/>
       </p:ext>
     </p:extLst>
   </p:cSld>
@@ -504,8 +509,8 @@
         </p:nvSpPr>
         <p:spPr>
           <a:xfrm>
-            <a:off x="3980735" y="48683"/>
-            <a:ext cx="1199436" cy="774912"/>
+            <a:off x="3980735" y="58403"/>
+            <a:ext cx="1199436" cy="929625"/>
           </a:xfrm>
         </p:spPr>
         <p:txBody>
@@ -532,8 +537,8 @@
         </p:nvSpPr>
         <p:spPr>
           <a:xfrm>
-            <a:off x="382429" y="48683"/>
-            <a:ext cx="3528774" cy="774912"/>
+            <a:off x="382429" y="58403"/>
+            <a:ext cx="3528774" cy="929625"/>
           </a:xfrm>
         </p:spPr>
         <p:txBody>
@@ -594,7 +599,7 @@
           <a:p>
             <a:fld id="{2D9AFD49-2911-40A0-8C34-1C3909DA5CA6}" type="datetimeFigureOut">
               <a:rPr lang="en-US" smtClean="0"/>
-              <a:t>6/4/2020</a:t>
+              <a:t>6/5/2020</a:t>
             </a:fld>
             <a:endParaRPr lang="en-US"/>
           </a:p>
@@ -645,7 +650,7 @@
     </p:spTree>
     <p:extLst>
       <p:ext uri="{BB962C8B-B14F-4D97-AF65-F5344CB8AC3E}">
-        <p14:creationId xmlns:p14="http://schemas.microsoft.com/office/powerpoint/2010/main" val="3611721029"/>
+        <p14:creationId xmlns:p14="http://schemas.microsoft.com/office/powerpoint/2010/main" val="3130711807"/>
       </p:ext>
     </p:extLst>
   </p:cSld>
@@ -764,7 +769,7 @@
           <a:p>
             <a:fld id="{2D9AFD49-2911-40A0-8C34-1C3909DA5CA6}" type="datetimeFigureOut">
               <a:rPr lang="en-US" smtClean="0"/>
-              <a:t>6/4/2020</a:t>
+              <a:t>6/5/2020</a:t>
             </a:fld>
             <a:endParaRPr lang="en-US"/>
           </a:p>
@@ -815,7 +820,7 @@
     </p:spTree>
     <p:extLst>
       <p:ext uri="{BB962C8B-B14F-4D97-AF65-F5344CB8AC3E}">
-        <p14:creationId xmlns:p14="http://schemas.microsoft.com/office/powerpoint/2010/main" val="1330920744"/>
+        <p14:creationId xmlns:p14="http://schemas.microsoft.com/office/powerpoint/2010/main" val="2375722119"/>
       </p:ext>
     </p:extLst>
   </p:cSld>
@@ -854,15 +859,15 @@
         </p:nvSpPr>
         <p:spPr>
           <a:xfrm>
-            <a:off x="379531" y="227965"/>
-            <a:ext cx="4797743" cy="380365"/>
+            <a:off x="379531" y="273479"/>
+            <a:ext cx="4797743" cy="456306"/>
           </a:xfrm>
         </p:spPr>
         <p:txBody>
           <a:bodyPr anchor="b"/>
           <a:lstStyle>
             <a:lvl1pPr>
-              <a:defRPr sz="800"/>
+              <a:defRPr sz="960"/>
             </a:lvl1pPr>
           </a:lstStyle>
           <a:p>
@@ -886,14 +891,24 @@
         </p:nvSpPr>
         <p:spPr>
           <a:xfrm>
-            <a:off x="379531" y="611928"/>
-            <a:ext cx="4797743" cy="200025"/>
+            <a:off x="379531" y="734102"/>
+            <a:ext cx="4797743" cy="239961"/>
           </a:xfrm>
         </p:spPr>
         <p:txBody>
           <a:bodyPr/>
           <a:lstStyle>
             <a:lvl1pPr marL="0" indent="0">
+              <a:buNone/>
+              <a:defRPr sz="384">
+                <a:solidFill>
+                  <a:schemeClr val="tx1">
+                    <a:tint val="75000"/>
+                  </a:schemeClr>
+                </a:solidFill>
+              </a:defRPr>
+            </a:lvl1pPr>
+            <a:lvl2pPr marL="73152" indent="0">
               <a:buNone/>
               <a:defRPr sz="320">
                 <a:solidFill>
@@ -902,20 +917,10 @@
                   </a:schemeClr>
                 </a:solidFill>
               </a:defRPr>
-            </a:lvl1pPr>
-            <a:lvl2pPr marL="60945" indent="0">
-              <a:buNone/>
-              <a:defRPr sz="267">
-                <a:solidFill>
-                  <a:schemeClr val="tx1">
-                    <a:tint val="75000"/>
-                  </a:schemeClr>
-                </a:solidFill>
-              </a:defRPr>
             </a:lvl2pPr>
-            <a:lvl3pPr marL="121890" indent="0">
-              <a:buNone/>
-              <a:defRPr sz="240">
+            <a:lvl3pPr marL="146304" indent="0">
+              <a:buNone/>
+              <a:defRPr sz="288">
                 <a:solidFill>
                   <a:schemeClr val="tx1">
                     <a:tint val="75000"/>
@@ -923,9 +928,9 @@
                 </a:solidFill>
               </a:defRPr>
             </a:lvl3pPr>
-            <a:lvl4pPr marL="182834" indent="0">
-              <a:buNone/>
-              <a:defRPr sz="213">
+            <a:lvl4pPr marL="219456" indent="0">
+              <a:buNone/>
+              <a:defRPr sz="256">
                 <a:solidFill>
                   <a:schemeClr val="tx1">
                     <a:tint val="75000"/>
@@ -933,9 +938,9 @@
                 </a:solidFill>
               </a:defRPr>
             </a:lvl4pPr>
-            <a:lvl5pPr marL="243779" indent="0">
-              <a:buNone/>
-              <a:defRPr sz="213">
+            <a:lvl5pPr marL="292608" indent="0">
+              <a:buNone/>
+              <a:defRPr sz="256">
                 <a:solidFill>
                   <a:schemeClr val="tx1">
                     <a:tint val="75000"/>
@@ -943,9 +948,9 @@
                 </a:solidFill>
               </a:defRPr>
             </a:lvl5pPr>
-            <a:lvl6pPr marL="304724" indent="0">
-              <a:buNone/>
-              <a:defRPr sz="213">
+            <a:lvl6pPr marL="365760" indent="0">
+              <a:buNone/>
+              <a:defRPr sz="256">
                 <a:solidFill>
                   <a:schemeClr val="tx1">
                     <a:tint val="75000"/>
@@ -953,9 +958,9 @@
                 </a:solidFill>
               </a:defRPr>
             </a:lvl6pPr>
-            <a:lvl7pPr marL="365669" indent="0">
-              <a:buNone/>
-              <a:defRPr sz="213">
+            <a:lvl7pPr marL="438912" indent="0">
+              <a:buNone/>
+              <a:defRPr sz="256">
                 <a:solidFill>
                   <a:schemeClr val="tx1">
                     <a:tint val="75000"/>
@@ -963,9 +968,9 @@
                 </a:solidFill>
               </a:defRPr>
             </a:lvl7pPr>
-            <a:lvl8pPr marL="426613" indent="0">
-              <a:buNone/>
-              <a:defRPr sz="213">
+            <a:lvl8pPr marL="512064" indent="0">
+              <a:buNone/>
+              <a:defRPr sz="256">
                 <a:solidFill>
                   <a:schemeClr val="tx1">
                     <a:tint val="75000"/>
@@ -973,9 +978,9 @@
                 </a:solidFill>
               </a:defRPr>
             </a:lvl8pPr>
-            <a:lvl9pPr marL="487558" indent="0">
-              <a:buNone/>
-              <a:defRPr sz="213">
+            <a:lvl9pPr marL="585216" indent="0">
+              <a:buNone/>
+              <a:defRPr sz="256">
                 <a:solidFill>
                   <a:schemeClr val="tx1">
                     <a:tint val="75000"/>
@@ -1010,7 +1015,7 @@
           <a:p>
             <a:fld id="{2D9AFD49-2911-40A0-8C34-1C3909DA5CA6}" type="datetimeFigureOut">
               <a:rPr lang="en-US" smtClean="0"/>
-              <a:t>6/4/2020</a:t>
+              <a:t>6/5/2020</a:t>
             </a:fld>
             <a:endParaRPr lang="en-US"/>
           </a:p>
@@ -1061,7 +1066,7 @@
     </p:spTree>
     <p:extLst>
       <p:ext uri="{BB962C8B-B14F-4D97-AF65-F5344CB8AC3E}">
-        <p14:creationId xmlns:p14="http://schemas.microsoft.com/office/powerpoint/2010/main" val="3183925196"/>
+        <p14:creationId xmlns:p14="http://schemas.microsoft.com/office/powerpoint/2010/main" val="1900661698"/>
       </p:ext>
     </p:extLst>
   </p:cSld>
@@ -1123,8 +1128,8 @@
         </p:nvSpPr>
         <p:spPr>
           <a:xfrm>
-            <a:off x="382429" y="243417"/>
-            <a:ext cx="2364105" cy="580178"/>
+            <a:off x="382429" y="292016"/>
+            <a:ext cx="2364105" cy="696013"/>
           </a:xfrm>
         </p:spPr>
         <p:txBody>
@@ -1180,8 +1185,8 @@
         </p:nvSpPr>
         <p:spPr>
           <a:xfrm>
-            <a:off x="2816066" y="243417"/>
-            <a:ext cx="2364105" cy="580178"/>
+            <a:off x="2816066" y="292016"/>
+            <a:ext cx="2364105" cy="696013"/>
           </a:xfrm>
         </p:spPr>
         <p:txBody>
@@ -1242,7 +1247,7 @@
           <a:p>
             <a:fld id="{2D9AFD49-2911-40A0-8C34-1C3909DA5CA6}" type="datetimeFigureOut">
               <a:rPr lang="en-US" smtClean="0"/>
-              <a:t>6/4/2020</a:t>
+              <a:t>6/5/2020</a:t>
             </a:fld>
             <a:endParaRPr lang="en-US"/>
           </a:p>
@@ -1293,7 +1298,7 @@
     </p:spTree>
     <p:extLst>
       <p:ext uri="{BB962C8B-B14F-4D97-AF65-F5344CB8AC3E}">
-        <p14:creationId xmlns:p14="http://schemas.microsoft.com/office/powerpoint/2010/main" val="2873889689"/>
+        <p14:creationId xmlns:p14="http://schemas.microsoft.com/office/powerpoint/2010/main" val="1045239011"/>
       </p:ext>
     </p:extLst>
   </p:cSld>
@@ -1332,8 +1337,8 @@
         </p:nvSpPr>
         <p:spPr>
           <a:xfrm>
-            <a:off x="383153" y="48683"/>
-            <a:ext cx="4797743" cy="176742"/>
+            <a:off x="383153" y="58403"/>
+            <a:ext cx="4797743" cy="212029"/>
           </a:xfrm>
         </p:spPr>
         <p:txBody>
@@ -1360,8 +1365,8 @@
         </p:nvSpPr>
         <p:spPr>
           <a:xfrm>
-            <a:off x="383154" y="224155"/>
-            <a:ext cx="2353240" cy="109855"/>
+            <a:off x="383154" y="268908"/>
+            <a:ext cx="2353240" cy="131788"/>
           </a:xfrm>
         </p:spPr>
         <p:txBody>
@@ -1369,39 +1374,39 @@
           <a:lstStyle>
             <a:lvl1pPr marL="0" indent="0">
               <a:buNone/>
+              <a:defRPr sz="384" b="1"/>
+            </a:lvl1pPr>
+            <a:lvl2pPr marL="73152" indent="0">
+              <a:buNone/>
               <a:defRPr sz="320" b="1"/>
-            </a:lvl1pPr>
-            <a:lvl2pPr marL="60945" indent="0">
-              <a:buNone/>
-              <a:defRPr sz="267" b="1"/>
             </a:lvl2pPr>
-            <a:lvl3pPr marL="121890" indent="0">
-              <a:buNone/>
-              <a:defRPr sz="240" b="1"/>
+            <a:lvl3pPr marL="146304" indent="0">
+              <a:buNone/>
+              <a:defRPr sz="288" b="1"/>
             </a:lvl3pPr>
-            <a:lvl4pPr marL="182834" indent="0">
-              <a:buNone/>
-              <a:defRPr sz="213" b="1"/>
+            <a:lvl4pPr marL="219456" indent="0">
+              <a:buNone/>
+              <a:defRPr sz="256" b="1"/>
             </a:lvl4pPr>
-            <a:lvl5pPr marL="243779" indent="0">
-              <a:buNone/>
-              <a:defRPr sz="213" b="1"/>
+            <a:lvl5pPr marL="292608" indent="0">
+              <a:buNone/>
+              <a:defRPr sz="256" b="1"/>
             </a:lvl5pPr>
-            <a:lvl6pPr marL="304724" indent="0">
-              <a:buNone/>
-              <a:defRPr sz="213" b="1"/>
+            <a:lvl6pPr marL="365760" indent="0">
+              <a:buNone/>
+              <a:defRPr sz="256" b="1"/>
             </a:lvl6pPr>
-            <a:lvl7pPr marL="365669" indent="0">
-              <a:buNone/>
-              <a:defRPr sz="213" b="1"/>
+            <a:lvl7pPr marL="438912" indent="0">
+              <a:buNone/>
+              <a:defRPr sz="256" b="1"/>
             </a:lvl7pPr>
-            <a:lvl8pPr marL="426613" indent="0">
-              <a:buNone/>
-              <a:defRPr sz="213" b="1"/>
+            <a:lvl8pPr marL="512064" indent="0">
+              <a:buNone/>
+              <a:defRPr sz="256" b="1"/>
             </a:lvl8pPr>
-            <a:lvl9pPr marL="487558" indent="0">
-              <a:buNone/>
-              <a:defRPr sz="213" b="1"/>
+            <a:lvl9pPr marL="585216" indent="0">
+              <a:buNone/>
+              <a:defRPr sz="256" b="1"/>
             </a:lvl9pPr>
           </a:lstStyle>
           <a:p>
@@ -1425,8 +1430,8 @@
         </p:nvSpPr>
         <p:spPr>
           <a:xfrm>
-            <a:off x="383154" y="334010"/>
-            <a:ext cx="2353240" cy="491278"/>
+            <a:off x="383154" y="400696"/>
+            <a:ext cx="2353240" cy="589364"/>
           </a:xfrm>
         </p:spPr>
         <p:txBody>
@@ -1482,8 +1487,8 @@
         </p:nvSpPr>
         <p:spPr>
           <a:xfrm>
-            <a:off x="2816066" y="224155"/>
-            <a:ext cx="2364830" cy="109855"/>
+            <a:off x="2816066" y="268908"/>
+            <a:ext cx="2364830" cy="131788"/>
           </a:xfrm>
         </p:spPr>
         <p:txBody>
@@ -1491,39 +1496,39 @@
           <a:lstStyle>
             <a:lvl1pPr marL="0" indent="0">
               <a:buNone/>
+              <a:defRPr sz="384" b="1"/>
+            </a:lvl1pPr>
+            <a:lvl2pPr marL="73152" indent="0">
+              <a:buNone/>
               <a:defRPr sz="320" b="1"/>
-            </a:lvl1pPr>
-            <a:lvl2pPr marL="60945" indent="0">
-              <a:buNone/>
-              <a:defRPr sz="267" b="1"/>
             </a:lvl2pPr>
-            <a:lvl3pPr marL="121890" indent="0">
-              <a:buNone/>
-              <a:defRPr sz="240" b="1"/>
+            <a:lvl3pPr marL="146304" indent="0">
+              <a:buNone/>
+              <a:defRPr sz="288" b="1"/>
             </a:lvl3pPr>
-            <a:lvl4pPr marL="182834" indent="0">
-              <a:buNone/>
-              <a:defRPr sz="213" b="1"/>
+            <a:lvl4pPr marL="219456" indent="0">
+              <a:buNone/>
+              <a:defRPr sz="256" b="1"/>
             </a:lvl4pPr>
-            <a:lvl5pPr marL="243779" indent="0">
-              <a:buNone/>
-              <a:defRPr sz="213" b="1"/>
+            <a:lvl5pPr marL="292608" indent="0">
+              <a:buNone/>
+              <a:defRPr sz="256" b="1"/>
             </a:lvl5pPr>
-            <a:lvl6pPr marL="304724" indent="0">
-              <a:buNone/>
-              <a:defRPr sz="213" b="1"/>
+            <a:lvl6pPr marL="365760" indent="0">
+              <a:buNone/>
+              <a:defRPr sz="256" b="1"/>
             </a:lvl6pPr>
-            <a:lvl7pPr marL="365669" indent="0">
-              <a:buNone/>
-              <a:defRPr sz="213" b="1"/>
+            <a:lvl7pPr marL="438912" indent="0">
+              <a:buNone/>
+              <a:defRPr sz="256" b="1"/>
             </a:lvl7pPr>
-            <a:lvl8pPr marL="426613" indent="0">
-              <a:buNone/>
-              <a:defRPr sz="213" b="1"/>
+            <a:lvl8pPr marL="512064" indent="0">
+              <a:buNone/>
+              <a:defRPr sz="256" b="1"/>
             </a:lvl8pPr>
-            <a:lvl9pPr marL="487558" indent="0">
-              <a:buNone/>
-              <a:defRPr sz="213" b="1"/>
+            <a:lvl9pPr marL="585216" indent="0">
+              <a:buNone/>
+              <a:defRPr sz="256" b="1"/>
             </a:lvl9pPr>
           </a:lstStyle>
           <a:p>
@@ -1547,8 +1552,8 @@
         </p:nvSpPr>
         <p:spPr>
           <a:xfrm>
-            <a:off x="2816066" y="334010"/>
-            <a:ext cx="2364830" cy="491278"/>
+            <a:off x="2816066" y="400696"/>
+            <a:ext cx="2364830" cy="589364"/>
           </a:xfrm>
         </p:spPr>
         <p:txBody>
@@ -1609,7 +1614,7 @@
           <a:p>
             <a:fld id="{2D9AFD49-2911-40A0-8C34-1C3909DA5CA6}" type="datetimeFigureOut">
               <a:rPr lang="en-US" smtClean="0"/>
-              <a:t>6/4/2020</a:t>
+              <a:t>6/5/2020</a:t>
             </a:fld>
             <a:endParaRPr lang="en-US"/>
           </a:p>
@@ -1660,7 +1665,7 @@
     </p:spTree>
     <p:extLst>
       <p:ext uri="{BB962C8B-B14F-4D97-AF65-F5344CB8AC3E}">
-        <p14:creationId xmlns:p14="http://schemas.microsoft.com/office/powerpoint/2010/main" val="4202203055"/>
+        <p14:creationId xmlns:p14="http://schemas.microsoft.com/office/powerpoint/2010/main" val="1467921067"/>
       </p:ext>
     </p:extLst>
   </p:cSld>
@@ -1727,7 +1732,7 @@
           <a:p>
             <a:fld id="{2D9AFD49-2911-40A0-8C34-1C3909DA5CA6}" type="datetimeFigureOut">
               <a:rPr lang="en-US" smtClean="0"/>
-              <a:t>6/4/2020</a:t>
+              <a:t>6/5/2020</a:t>
             </a:fld>
             <a:endParaRPr lang="en-US"/>
           </a:p>
@@ -1778,7 +1783,7 @@
     </p:spTree>
     <p:extLst>
       <p:ext uri="{BB962C8B-B14F-4D97-AF65-F5344CB8AC3E}">
-        <p14:creationId xmlns:p14="http://schemas.microsoft.com/office/powerpoint/2010/main" val="897955639"/>
+        <p14:creationId xmlns:p14="http://schemas.microsoft.com/office/powerpoint/2010/main" val="2622182328"/>
       </p:ext>
     </p:extLst>
   </p:cSld>
@@ -1822,7 +1827,7 @@
           <a:p>
             <a:fld id="{2D9AFD49-2911-40A0-8C34-1C3909DA5CA6}" type="datetimeFigureOut">
               <a:rPr lang="en-US" smtClean="0"/>
-              <a:t>6/4/2020</a:t>
+              <a:t>6/5/2020</a:t>
             </a:fld>
             <a:endParaRPr lang="en-US"/>
           </a:p>
@@ -1873,7 +1878,7 @@
     </p:spTree>
     <p:extLst>
       <p:ext uri="{BB962C8B-B14F-4D97-AF65-F5344CB8AC3E}">
-        <p14:creationId xmlns:p14="http://schemas.microsoft.com/office/powerpoint/2010/main" val="762254483"/>
+        <p14:creationId xmlns:p14="http://schemas.microsoft.com/office/powerpoint/2010/main" val="1888776296"/>
       </p:ext>
     </p:extLst>
   </p:cSld>
@@ -1912,15 +1917,15 @@
         </p:nvSpPr>
         <p:spPr>
           <a:xfrm>
-            <a:off x="383154" y="60960"/>
-            <a:ext cx="1794083" cy="213360"/>
+            <a:off x="383154" y="73131"/>
+            <a:ext cx="1794083" cy="255958"/>
           </a:xfrm>
         </p:spPr>
         <p:txBody>
           <a:bodyPr anchor="b"/>
           <a:lstStyle>
             <a:lvl1pPr>
-              <a:defRPr sz="427"/>
+              <a:defRPr sz="512"/>
             </a:lvl1pPr>
           </a:lstStyle>
           <a:p>
@@ -1944,39 +1949,39 @@
         </p:nvSpPr>
         <p:spPr>
           <a:xfrm>
-            <a:off x="2364830" y="131657"/>
-            <a:ext cx="2816066" cy="649817"/>
+            <a:off x="2364830" y="157942"/>
+            <a:ext cx="2816066" cy="779555"/>
           </a:xfrm>
         </p:spPr>
         <p:txBody>
           <a:bodyPr/>
           <a:lstStyle>
             <a:lvl1pPr>
-              <a:defRPr sz="427"/>
+              <a:defRPr sz="512"/>
             </a:lvl1pPr>
             <a:lvl2pPr>
-              <a:defRPr sz="373"/>
+              <a:defRPr sz="448"/>
             </a:lvl2pPr>
             <a:lvl3pPr>
-              <a:defRPr sz="320"/>
+              <a:defRPr sz="384"/>
             </a:lvl3pPr>
             <a:lvl4pPr>
-              <a:defRPr sz="267"/>
+              <a:defRPr sz="320"/>
             </a:lvl4pPr>
             <a:lvl5pPr>
-              <a:defRPr sz="267"/>
+              <a:defRPr sz="320"/>
             </a:lvl5pPr>
             <a:lvl6pPr>
-              <a:defRPr sz="267"/>
+              <a:defRPr sz="320"/>
             </a:lvl6pPr>
             <a:lvl7pPr>
-              <a:defRPr sz="267"/>
+              <a:defRPr sz="320"/>
             </a:lvl7pPr>
             <a:lvl8pPr>
-              <a:defRPr sz="267"/>
+              <a:defRPr sz="320"/>
             </a:lvl8pPr>
             <a:lvl9pPr>
-              <a:defRPr sz="267"/>
+              <a:defRPr sz="320"/>
             </a:lvl9pPr>
           </a:lstStyle>
           <a:p>
@@ -2029,8 +2034,8 @@
         </p:nvSpPr>
         <p:spPr>
           <a:xfrm>
-            <a:off x="383154" y="274320"/>
-            <a:ext cx="1794083" cy="508212"/>
+            <a:off x="383154" y="329089"/>
+            <a:ext cx="1794083" cy="609678"/>
           </a:xfrm>
         </p:spPr>
         <p:txBody>
@@ -2038,39 +2043,39 @@
           <a:lstStyle>
             <a:lvl1pPr marL="0" indent="0">
               <a:buNone/>
-              <a:defRPr sz="213"/>
+              <a:defRPr sz="256"/>
             </a:lvl1pPr>
-            <a:lvl2pPr marL="60945" indent="0">
-              <a:buNone/>
-              <a:defRPr sz="187"/>
+            <a:lvl2pPr marL="73152" indent="0">
+              <a:buNone/>
+              <a:defRPr sz="224"/>
             </a:lvl2pPr>
-            <a:lvl3pPr marL="121890" indent="0">
+            <a:lvl3pPr marL="146304" indent="0">
+              <a:buNone/>
+              <a:defRPr sz="192"/>
+            </a:lvl3pPr>
+            <a:lvl4pPr marL="219456" indent="0">
               <a:buNone/>
               <a:defRPr sz="160"/>
-            </a:lvl3pPr>
-            <a:lvl4pPr marL="182834" indent="0">
-              <a:buNone/>
-              <a:defRPr sz="133"/>
             </a:lvl4pPr>
-            <a:lvl5pPr marL="243779" indent="0">
-              <a:buNone/>
-              <a:defRPr sz="133"/>
+            <a:lvl5pPr marL="292608" indent="0">
+              <a:buNone/>
+              <a:defRPr sz="160"/>
             </a:lvl5pPr>
-            <a:lvl6pPr marL="304724" indent="0">
-              <a:buNone/>
-              <a:defRPr sz="133"/>
+            <a:lvl6pPr marL="365760" indent="0">
+              <a:buNone/>
+              <a:defRPr sz="160"/>
             </a:lvl6pPr>
-            <a:lvl7pPr marL="365669" indent="0">
-              <a:buNone/>
-              <a:defRPr sz="133"/>
+            <a:lvl7pPr marL="438912" indent="0">
+              <a:buNone/>
+              <a:defRPr sz="160"/>
             </a:lvl7pPr>
-            <a:lvl8pPr marL="426613" indent="0">
-              <a:buNone/>
-              <a:defRPr sz="133"/>
+            <a:lvl8pPr marL="512064" indent="0">
+              <a:buNone/>
+              <a:defRPr sz="160"/>
             </a:lvl8pPr>
-            <a:lvl9pPr marL="487558" indent="0">
-              <a:buNone/>
-              <a:defRPr sz="133"/>
+            <a:lvl9pPr marL="585216" indent="0">
+              <a:buNone/>
+              <a:defRPr sz="160"/>
             </a:lvl9pPr>
           </a:lstStyle>
           <a:p>
@@ -2099,7 +2104,7 @@
           <a:p>
             <a:fld id="{2D9AFD49-2911-40A0-8C34-1C3909DA5CA6}" type="datetimeFigureOut">
               <a:rPr lang="en-US" smtClean="0"/>
-              <a:t>6/4/2020</a:t>
+              <a:t>6/5/2020</a:t>
             </a:fld>
             <a:endParaRPr lang="en-US"/>
           </a:p>
@@ -2150,7 +2155,7 @@
     </p:spTree>
     <p:extLst>
       <p:ext uri="{BB962C8B-B14F-4D97-AF65-F5344CB8AC3E}">
-        <p14:creationId xmlns:p14="http://schemas.microsoft.com/office/powerpoint/2010/main" val="1258150196"/>
+        <p14:creationId xmlns:p14="http://schemas.microsoft.com/office/powerpoint/2010/main" val="995377272"/>
       </p:ext>
     </p:extLst>
   </p:cSld>
@@ -2189,15 +2194,15 @@
         </p:nvSpPr>
         <p:spPr>
           <a:xfrm>
-            <a:off x="383154" y="60960"/>
-            <a:ext cx="1794083" cy="213360"/>
+            <a:off x="383154" y="73131"/>
+            <a:ext cx="1794083" cy="255958"/>
           </a:xfrm>
         </p:spPr>
         <p:txBody>
           <a:bodyPr anchor="b"/>
           <a:lstStyle>
             <a:lvl1pPr>
-              <a:defRPr sz="427"/>
+              <a:defRPr sz="512"/>
             </a:lvl1pPr>
           </a:lstStyle>
           <a:p>
@@ -2221,8 +2226,8 @@
         </p:nvSpPr>
         <p:spPr>
           <a:xfrm>
-            <a:off x="2364830" y="131657"/>
-            <a:ext cx="2816066" cy="649817"/>
+            <a:off x="2364830" y="157942"/>
+            <a:ext cx="2816066" cy="779555"/>
           </a:xfrm>
         </p:spPr>
         <p:txBody>
@@ -2230,39 +2235,39 @@
           <a:lstStyle>
             <a:lvl1pPr marL="0" indent="0">
               <a:buNone/>
-              <a:defRPr sz="427"/>
+              <a:defRPr sz="512"/>
             </a:lvl1pPr>
-            <a:lvl2pPr marL="60945" indent="0">
-              <a:buNone/>
-              <a:defRPr sz="373"/>
+            <a:lvl2pPr marL="73152" indent="0">
+              <a:buNone/>
+              <a:defRPr sz="448"/>
             </a:lvl2pPr>
-            <a:lvl3pPr marL="121890" indent="0">
+            <a:lvl3pPr marL="146304" indent="0">
+              <a:buNone/>
+              <a:defRPr sz="384"/>
+            </a:lvl3pPr>
+            <a:lvl4pPr marL="219456" indent="0">
               <a:buNone/>
               <a:defRPr sz="320"/>
-            </a:lvl3pPr>
-            <a:lvl4pPr marL="182834" indent="0">
-              <a:buNone/>
-              <a:defRPr sz="267"/>
             </a:lvl4pPr>
-            <a:lvl5pPr marL="243779" indent="0">
-              <a:buNone/>
-              <a:defRPr sz="267"/>
+            <a:lvl5pPr marL="292608" indent="0">
+              <a:buNone/>
+              <a:defRPr sz="320"/>
             </a:lvl5pPr>
-            <a:lvl6pPr marL="304724" indent="0">
-              <a:buNone/>
-              <a:defRPr sz="267"/>
+            <a:lvl6pPr marL="365760" indent="0">
+              <a:buNone/>
+              <a:defRPr sz="320"/>
             </a:lvl6pPr>
-            <a:lvl7pPr marL="365669" indent="0">
-              <a:buNone/>
-              <a:defRPr sz="267"/>
+            <a:lvl7pPr marL="438912" indent="0">
+              <a:buNone/>
+              <a:defRPr sz="320"/>
             </a:lvl7pPr>
-            <a:lvl8pPr marL="426613" indent="0">
-              <a:buNone/>
-              <a:defRPr sz="267"/>
+            <a:lvl8pPr marL="512064" indent="0">
+              <a:buNone/>
+              <a:defRPr sz="320"/>
             </a:lvl8pPr>
-            <a:lvl9pPr marL="487558" indent="0">
-              <a:buNone/>
-              <a:defRPr sz="267"/>
+            <a:lvl9pPr marL="585216" indent="0">
+              <a:buNone/>
+              <a:defRPr sz="320"/>
             </a:lvl9pPr>
           </a:lstStyle>
           <a:p>
@@ -2286,8 +2291,8 @@
         </p:nvSpPr>
         <p:spPr>
           <a:xfrm>
-            <a:off x="383154" y="274320"/>
-            <a:ext cx="1794083" cy="508212"/>
+            <a:off x="383154" y="329089"/>
+            <a:ext cx="1794083" cy="609678"/>
           </a:xfrm>
         </p:spPr>
         <p:txBody>
@@ -2295,39 +2300,39 @@
           <a:lstStyle>
             <a:lvl1pPr marL="0" indent="0">
               <a:buNone/>
-              <a:defRPr sz="213"/>
+              <a:defRPr sz="256"/>
             </a:lvl1pPr>
-            <a:lvl2pPr marL="60945" indent="0">
-              <a:buNone/>
-              <a:defRPr sz="187"/>
+            <a:lvl2pPr marL="73152" indent="0">
+              <a:buNone/>
+              <a:defRPr sz="224"/>
             </a:lvl2pPr>
-            <a:lvl3pPr marL="121890" indent="0">
+            <a:lvl3pPr marL="146304" indent="0">
+              <a:buNone/>
+              <a:defRPr sz="192"/>
+            </a:lvl3pPr>
+            <a:lvl4pPr marL="219456" indent="0">
               <a:buNone/>
               <a:defRPr sz="160"/>
-            </a:lvl3pPr>
-            <a:lvl4pPr marL="182834" indent="0">
-              <a:buNone/>
-              <a:defRPr sz="133"/>
             </a:lvl4pPr>
-            <a:lvl5pPr marL="243779" indent="0">
-              <a:buNone/>
-              <a:defRPr sz="133"/>
+            <a:lvl5pPr marL="292608" indent="0">
+              <a:buNone/>
+              <a:defRPr sz="160"/>
             </a:lvl5pPr>
-            <a:lvl6pPr marL="304724" indent="0">
-              <a:buNone/>
-              <a:defRPr sz="133"/>
+            <a:lvl6pPr marL="365760" indent="0">
+              <a:buNone/>
+              <a:defRPr sz="160"/>
             </a:lvl6pPr>
-            <a:lvl7pPr marL="365669" indent="0">
-              <a:buNone/>
-              <a:defRPr sz="133"/>
+            <a:lvl7pPr marL="438912" indent="0">
+              <a:buNone/>
+              <a:defRPr sz="160"/>
             </a:lvl7pPr>
-            <a:lvl8pPr marL="426613" indent="0">
-              <a:buNone/>
-              <a:defRPr sz="133"/>
+            <a:lvl8pPr marL="512064" indent="0">
+              <a:buNone/>
+              <a:defRPr sz="160"/>
             </a:lvl8pPr>
-            <a:lvl9pPr marL="487558" indent="0">
-              <a:buNone/>
-              <a:defRPr sz="133"/>
+            <a:lvl9pPr marL="585216" indent="0">
+              <a:buNone/>
+              <a:defRPr sz="160"/>
             </a:lvl9pPr>
           </a:lstStyle>
           <a:p>
@@ -2356,7 +2361,7 @@
           <a:p>
             <a:fld id="{2D9AFD49-2911-40A0-8C34-1C3909DA5CA6}" type="datetimeFigureOut">
               <a:rPr lang="en-US" smtClean="0"/>
-              <a:t>6/4/2020</a:t>
+              <a:t>6/5/2020</a:t>
             </a:fld>
             <a:endParaRPr lang="en-US"/>
           </a:p>
@@ -2407,7 +2412,7 @@
     </p:spTree>
     <p:extLst>
       <p:ext uri="{BB962C8B-B14F-4D97-AF65-F5344CB8AC3E}">
-        <p14:creationId xmlns:p14="http://schemas.microsoft.com/office/powerpoint/2010/main" val="4147277715"/>
+        <p14:creationId xmlns:p14="http://schemas.microsoft.com/office/powerpoint/2010/main" val="685630819"/>
       </p:ext>
     </p:extLst>
   </p:cSld>
@@ -2451,8 +2456,8 @@
         </p:nvSpPr>
         <p:spPr>
           <a:xfrm>
-            <a:off x="382429" y="48683"/>
-            <a:ext cx="4797743" cy="176742"/>
+            <a:off x="382429" y="58403"/>
+            <a:ext cx="4797743" cy="212029"/>
           </a:xfrm>
           <a:prstGeom prst="rect">
             <a:avLst/>
@@ -2484,8 +2489,8 @@
         </p:nvSpPr>
         <p:spPr>
           <a:xfrm>
-            <a:off x="382429" y="243417"/>
-            <a:ext cx="4797743" cy="580178"/>
+            <a:off x="382429" y="292016"/>
+            <a:ext cx="4797743" cy="696013"/>
           </a:xfrm>
           <a:prstGeom prst="rect">
             <a:avLst/>
@@ -2546,8 +2551,8 @@
         </p:nvSpPr>
         <p:spPr>
           <a:xfrm>
-            <a:off x="382429" y="847514"/>
-            <a:ext cx="1251585" cy="48683"/>
+            <a:off x="382429" y="1016722"/>
+            <a:ext cx="1251585" cy="58403"/>
           </a:xfrm>
           <a:prstGeom prst="rect">
             <a:avLst/>
@@ -2557,7 +2562,7 @@
           <a:bodyPr vert="horz" lIns="91440" tIns="45720" rIns="91440" bIns="45720" rtlCol="0" anchor="ctr"/>
           <a:lstStyle>
             <a:lvl1pPr algn="l">
-              <a:defRPr sz="160">
+              <a:defRPr sz="192">
                 <a:solidFill>
                   <a:schemeClr val="tx1">
                     <a:tint val="75000"/>
@@ -2569,7 +2574,7 @@
           <a:p>
             <a:fld id="{2D9AFD49-2911-40A0-8C34-1C3909DA5CA6}" type="datetimeFigureOut">
               <a:rPr lang="en-US" smtClean="0"/>
-              <a:t>6/4/2020</a:t>
+              <a:t>6/5/2020</a:t>
             </a:fld>
             <a:endParaRPr lang="en-US"/>
           </a:p>
@@ -2587,8 +2592,8 @@
         </p:nvSpPr>
         <p:spPr>
           <a:xfrm>
-            <a:off x="1842611" y="847514"/>
-            <a:ext cx="1877378" cy="48683"/>
+            <a:off x="1842611" y="1016722"/>
+            <a:ext cx="1877378" cy="58403"/>
           </a:xfrm>
           <a:prstGeom prst="rect">
             <a:avLst/>
@@ -2598,7 +2603,7 @@
           <a:bodyPr vert="horz" lIns="91440" tIns="45720" rIns="91440" bIns="45720" rtlCol="0" anchor="ctr"/>
           <a:lstStyle>
             <a:lvl1pPr algn="ctr">
-              <a:defRPr sz="160">
+              <a:defRPr sz="192">
                 <a:solidFill>
                   <a:schemeClr val="tx1">
                     <a:tint val="75000"/>
@@ -2624,8 +2629,8 @@
         </p:nvSpPr>
         <p:spPr>
           <a:xfrm>
-            <a:off x="3928586" y="847514"/>
-            <a:ext cx="1251585" cy="48683"/>
+            <a:off x="3928586" y="1016722"/>
+            <a:ext cx="1251585" cy="58403"/>
           </a:xfrm>
           <a:prstGeom prst="rect">
             <a:avLst/>
@@ -2635,7 +2640,7 @@
           <a:bodyPr vert="horz" lIns="91440" tIns="45720" rIns="91440" bIns="45720" rtlCol="0" anchor="ctr"/>
           <a:lstStyle>
             <a:lvl1pPr algn="r">
-              <a:defRPr sz="160">
+              <a:defRPr sz="192">
                 <a:solidFill>
                   <a:schemeClr val="tx1">
                     <a:tint val="75000"/>
@@ -2656,27 +2661,27 @@
     </p:spTree>
     <p:extLst>
       <p:ext uri="{BB962C8B-B14F-4D97-AF65-F5344CB8AC3E}">
-        <p14:creationId xmlns:p14="http://schemas.microsoft.com/office/powerpoint/2010/main" val="3382897619"/>
+        <p14:creationId xmlns:p14="http://schemas.microsoft.com/office/powerpoint/2010/main" val="2662148998"/>
       </p:ext>
     </p:extLst>
   </p:cSld>
   <p:clrMap bg1="lt1" tx1="dk1" bg2="lt2" tx2="dk2" accent1="accent1" accent2="accent2" accent3="accent3" accent4="accent4" accent5="accent5" accent6="accent6" hlink="hlink" folHlink="folHlink"/>
   <p:sldLayoutIdLst>
-    <p:sldLayoutId id="2147483721" r:id="rId1"/>
-    <p:sldLayoutId id="2147483722" r:id="rId2"/>
-    <p:sldLayoutId id="2147483723" r:id="rId3"/>
-    <p:sldLayoutId id="2147483724" r:id="rId4"/>
-    <p:sldLayoutId id="2147483725" r:id="rId5"/>
-    <p:sldLayoutId id="2147483726" r:id="rId6"/>
-    <p:sldLayoutId id="2147483727" r:id="rId7"/>
-    <p:sldLayoutId id="2147483728" r:id="rId8"/>
-    <p:sldLayoutId id="2147483729" r:id="rId9"/>
-    <p:sldLayoutId id="2147483730" r:id="rId10"/>
-    <p:sldLayoutId id="2147483731" r:id="rId11"/>
+    <p:sldLayoutId id="2147483733" r:id="rId1"/>
+    <p:sldLayoutId id="2147483734" r:id="rId2"/>
+    <p:sldLayoutId id="2147483735" r:id="rId3"/>
+    <p:sldLayoutId id="2147483736" r:id="rId4"/>
+    <p:sldLayoutId id="2147483737" r:id="rId5"/>
+    <p:sldLayoutId id="2147483738" r:id="rId6"/>
+    <p:sldLayoutId id="2147483739" r:id="rId7"/>
+    <p:sldLayoutId id="2147483740" r:id="rId8"/>
+    <p:sldLayoutId id="2147483741" r:id="rId9"/>
+    <p:sldLayoutId id="2147483742" r:id="rId10"/>
+    <p:sldLayoutId id="2147483743" r:id="rId11"/>
   </p:sldLayoutIdLst>
   <p:txStyles>
     <p:titleStyle>
-      <a:lvl1pPr algn="l" defTabSz="121890" rtl="0" eaLnBrk="1" latinLnBrk="0" hangingPunct="1">
+      <a:lvl1pPr algn="l" defTabSz="146304" rtl="0" eaLnBrk="1" latinLnBrk="0" hangingPunct="1">
         <a:lnSpc>
           <a:spcPct val="90000"/>
         </a:lnSpc>
@@ -2684,7 +2689,7 @@
           <a:spcPct val="0"/>
         </a:spcBef>
         <a:buNone/>
-        <a:defRPr sz="587" kern="1200">
+        <a:defRPr sz="704" kern="1200">
           <a:solidFill>
             <a:schemeClr val="tx1"/>
           </a:solidFill>
@@ -2695,16 +2700,16 @@
       </a:lvl1pPr>
     </p:titleStyle>
     <p:bodyStyle>
-      <a:lvl1pPr marL="30472" indent="-30472" algn="l" defTabSz="121890" rtl="0" eaLnBrk="1" latinLnBrk="0" hangingPunct="1">
+      <a:lvl1pPr marL="36576" indent="-36576" algn="l" defTabSz="146304" rtl="0" eaLnBrk="1" latinLnBrk="0" hangingPunct="1">
         <a:lnSpc>
           <a:spcPct val="90000"/>
         </a:lnSpc>
         <a:spcBef>
-          <a:spcPts val="133"/>
+          <a:spcPts val="160"/>
         </a:spcBef>
         <a:buFont typeface="Arial" panose="020B0604020202020204" pitchFamily="34" charset="0"/>
         <a:buChar char="•"/>
-        <a:defRPr sz="373" kern="1200">
+        <a:defRPr sz="448" kern="1200">
           <a:solidFill>
             <a:schemeClr val="tx1"/>
           </a:solidFill>
@@ -2713,12 +2718,30 @@
           <a:cs typeface="+mn-cs"/>
         </a:defRPr>
       </a:lvl1pPr>
-      <a:lvl2pPr marL="91417" indent="-30472" algn="l" defTabSz="121890" rtl="0" eaLnBrk="1" latinLnBrk="0" hangingPunct="1">
+      <a:lvl2pPr marL="109728" indent="-36576" algn="l" defTabSz="146304" rtl="0" eaLnBrk="1" latinLnBrk="0" hangingPunct="1">
         <a:lnSpc>
           <a:spcPct val="90000"/>
         </a:lnSpc>
         <a:spcBef>
-          <a:spcPts val="67"/>
+          <a:spcPts val="80"/>
+        </a:spcBef>
+        <a:buFont typeface="Arial" panose="020B0604020202020204" pitchFamily="34" charset="0"/>
+        <a:buChar char="•"/>
+        <a:defRPr sz="384" kern="1200">
+          <a:solidFill>
+            <a:schemeClr val="tx1"/>
+          </a:solidFill>
+          <a:latin typeface="+mn-lt"/>
+          <a:ea typeface="+mn-ea"/>
+          <a:cs typeface="+mn-cs"/>
+        </a:defRPr>
+      </a:lvl2pPr>
+      <a:lvl3pPr marL="182880" indent="-36576" algn="l" defTabSz="146304" rtl="0" eaLnBrk="1" latinLnBrk="0" hangingPunct="1">
+        <a:lnSpc>
+          <a:spcPct val="90000"/>
+        </a:lnSpc>
+        <a:spcBef>
+          <a:spcPts val="80"/>
         </a:spcBef>
         <a:buFont typeface="Arial" panose="020B0604020202020204" pitchFamily="34" charset="0"/>
         <a:buChar char="•"/>
@@ -2730,35 +2753,17 @@
           <a:ea typeface="+mn-ea"/>
           <a:cs typeface="+mn-cs"/>
         </a:defRPr>
-      </a:lvl2pPr>
-      <a:lvl3pPr marL="152362" indent="-30472" algn="l" defTabSz="121890" rtl="0" eaLnBrk="1" latinLnBrk="0" hangingPunct="1">
+      </a:lvl3pPr>
+      <a:lvl4pPr marL="256032" indent="-36576" algn="l" defTabSz="146304" rtl="0" eaLnBrk="1" latinLnBrk="0" hangingPunct="1">
         <a:lnSpc>
           <a:spcPct val="90000"/>
         </a:lnSpc>
         <a:spcBef>
-          <a:spcPts val="67"/>
+          <a:spcPts val="80"/>
         </a:spcBef>
         <a:buFont typeface="Arial" panose="020B0604020202020204" pitchFamily="34" charset="0"/>
         <a:buChar char="•"/>
-        <a:defRPr sz="267" kern="1200">
-          <a:solidFill>
-            <a:schemeClr val="tx1"/>
-          </a:solidFill>
-          <a:latin typeface="+mn-lt"/>
-          <a:ea typeface="+mn-ea"/>
-          <a:cs typeface="+mn-cs"/>
-        </a:defRPr>
-      </a:lvl3pPr>
-      <a:lvl4pPr marL="213307" indent="-30472" algn="l" defTabSz="121890" rtl="0" eaLnBrk="1" latinLnBrk="0" hangingPunct="1">
-        <a:lnSpc>
-          <a:spcPct val="90000"/>
-        </a:lnSpc>
-        <a:spcBef>
-          <a:spcPts val="67"/>
-        </a:spcBef>
-        <a:buFont typeface="Arial" panose="020B0604020202020204" pitchFamily="34" charset="0"/>
-        <a:buChar char="•"/>
-        <a:defRPr sz="240" kern="1200">
+        <a:defRPr sz="288" kern="1200">
           <a:solidFill>
             <a:schemeClr val="tx1"/>
           </a:solidFill>
@@ -2767,16 +2772,16 @@
           <a:cs typeface="+mn-cs"/>
         </a:defRPr>
       </a:lvl4pPr>
-      <a:lvl5pPr marL="274251" indent="-30472" algn="l" defTabSz="121890" rtl="0" eaLnBrk="1" latinLnBrk="0" hangingPunct="1">
+      <a:lvl5pPr marL="329184" indent="-36576" algn="l" defTabSz="146304" rtl="0" eaLnBrk="1" latinLnBrk="0" hangingPunct="1">
         <a:lnSpc>
           <a:spcPct val="90000"/>
         </a:lnSpc>
         <a:spcBef>
-          <a:spcPts val="67"/>
+          <a:spcPts val="80"/>
         </a:spcBef>
         <a:buFont typeface="Arial" panose="020B0604020202020204" pitchFamily="34" charset="0"/>
         <a:buChar char="•"/>
-        <a:defRPr sz="240" kern="1200">
+        <a:defRPr sz="288" kern="1200">
           <a:solidFill>
             <a:schemeClr val="tx1"/>
           </a:solidFill>
@@ -2785,16 +2790,16 @@
           <a:cs typeface="+mn-cs"/>
         </a:defRPr>
       </a:lvl5pPr>
-      <a:lvl6pPr marL="335196" indent="-30472" algn="l" defTabSz="121890" rtl="0" eaLnBrk="1" latinLnBrk="0" hangingPunct="1">
+      <a:lvl6pPr marL="402336" indent="-36576" algn="l" defTabSz="146304" rtl="0" eaLnBrk="1" latinLnBrk="0" hangingPunct="1">
         <a:lnSpc>
           <a:spcPct val="90000"/>
         </a:lnSpc>
         <a:spcBef>
-          <a:spcPts val="67"/>
+          <a:spcPts val="80"/>
         </a:spcBef>
         <a:buFont typeface="Arial" panose="020B0604020202020204" pitchFamily="34" charset="0"/>
         <a:buChar char="•"/>
-        <a:defRPr sz="240" kern="1200">
+        <a:defRPr sz="288" kern="1200">
           <a:solidFill>
             <a:schemeClr val="tx1"/>
           </a:solidFill>
@@ -2803,16 +2808,16 @@
           <a:cs typeface="+mn-cs"/>
         </a:defRPr>
       </a:lvl6pPr>
-      <a:lvl7pPr marL="396141" indent="-30472" algn="l" defTabSz="121890" rtl="0" eaLnBrk="1" latinLnBrk="0" hangingPunct="1">
+      <a:lvl7pPr marL="475488" indent="-36576" algn="l" defTabSz="146304" rtl="0" eaLnBrk="1" latinLnBrk="0" hangingPunct="1">
         <a:lnSpc>
           <a:spcPct val="90000"/>
         </a:lnSpc>
         <a:spcBef>
-          <a:spcPts val="67"/>
+          <a:spcPts val="80"/>
         </a:spcBef>
         <a:buFont typeface="Arial" panose="020B0604020202020204" pitchFamily="34" charset="0"/>
         <a:buChar char="•"/>
-        <a:defRPr sz="240" kern="1200">
+        <a:defRPr sz="288" kern="1200">
           <a:solidFill>
             <a:schemeClr val="tx1"/>
           </a:solidFill>
@@ -2821,16 +2826,16 @@
           <a:cs typeface="+mn-cs"/>
         </a:defRPr>
       </a:lvl7pPr>
-      <a:lvl8pPr marL="457086" indent="-30472" algn="l" defTabSz="121890" rtl="0" eaLnBrk="1" latinLnBrk="0" hangingPunct="1">
+      <a:lvl8pPr marL="548640" indent="-36576" algn="l" defTabSz="146304" rtl="0" eaLnBrk="1" latinLnBrk="0" hangingPunct="1">
         <a:lnSpc>
           <a:spcPct val="90000"/>
         </a:lnSpc>
         <a:spcBef>
-          <a:spcPts val="67"/>
+          <a:spcPts val="80"/>
         </a:spcBef>
         <a:buFont typeface="Arial" panose="020B0604020202020204" pitchFamily="34" charset="0"/>
         <a:buChar char="•"/>
-        <a:defRPr sz="240" kern="1200">
+        <a:defRPr sz="288" kern="1200">
           <a:solidFill>
             <a:schemeClr val="tx1"/>
           </a:solidFill>
@@ -2839,16 +2844,16 @@
           <a:cs typeface="+mn-cs"/>
         </a:defRPr>
       </a:lvl8pPr>
-      <a:lvl9pPr marL="518030" indent="-30472" algn="l" defTabSz="121890" rtl="0" eaLnBrk="1" latinLnBrk="0" hangingPunct="1">
+      <a:lvl9pPr marL="621792" indent="-36576" algn="l" defTabSz="146304" rtl="0" eaLnBrk="1" latinLnBrk="0" hangingPunct="1">
         <a:lnSpc>
           <a:spcPct val="90000"/>
         </a:lnSpc>
         <a:spcBef>
-          <a:spcPts val="67"/>
+          <a:spcPts val="80"/>
         </a:spcBef>
         <a:buFont typeface="Arial" panose="020B0604020202020204" pitchFamily="34" charset="0"/>
         <a:buChar char="•"/>
-        <a:defRPr sz="240" kern="1200">
+        <a:defRPr sz="288" kern="1200">
           <a:solidFill>
             <a:schemeClr val="tx1"/>
           </a:solidFill>
@@ -2862,8 +2867,8 @@
       <a:defPPr>
         <a:defRPr lang="en-US"/>
       </a:defPPr>
-      <a:lvl1pPr marL="0" algn="l" defTabSz="121890" rtl="0" eaLnBrk="1" latinLnBrk="0" hangingPunct="1">
-        <a:defRPr sz="240" kern="1200">
+      <a:lvl1pPr marL="0" algn="l" defTabSz="146304" rtl="0" eaLnBrk="1" latinLnBrk="0" hangingPunct="1">
+        <a:defRPr sz="288" kern="1200">
           <a:solidFill>
             <a:schemeClr val="tx1"/>
           </a:solidFill>
@@ -2872,8 +2877,8 @@
           <a:cs typeface="+mn-cs"/>
         </a:defRPr>
       </a:lvl1pPr>
-      <a:lvl2pPr marL="60945" algn="l" defTabSz="121890" rtl="0" eaLnBrk="1" latinLnBrk="0" hangingPunct="1">
-        <a:defRPr sz="240" kern="1200">
+      <a:lvl2pPr marL="73152" algn="l" defTabSz="146304" rtl="0" eaLnBrk="1" latinLnBrk="0" hangingPunct="1">
+        <a:defRPr sz="288" kern="1200">
           <a:solidFill>
             <a:schemeClr val="tx1"/>
           </a:solidFill>
@@ -2882,8 +2887,8 @@
           <a:cs typeface="+mn-cs"/>
         </a:defRPr>
       </a:lvl2pPr>
-      <a:lvl3pPr marL="121890" algn="l" defTabSz="121890" rtl="0" eaLnBrk="1" latinLnBrk="0" hangingPunct="1">
-        <a:defRPr sz="240" kern="1200">
+      <a:lvl3pPr marL="146304" algn="l" defTabSz="146304" rtl="0" eaLnBrk="1" latinLnBrk="0" hangingPunct="1">
+        <a:defRPr sz="288" kern="1200">
           <a:solidFill>
             <a:schemeClr val="tx1"/>
           </a:solidFill>
@@ -2892,8 +2897,8 @@
           <a:cs typeface="+mn-cs"/>
         </a:defRPr>
       </a:lvl3pPr>
-      <a:lvl4pPr marL="182834" algn="l" defTabSz="121890" rtl="0" eaLnBrk="1" latinLnBrk="0" hangingPunct="1">
-        <a:defRPr sz="240" kern="1200">
+      <a:lvl4pPr marL="219456" algn="l" defTabSz="146304" rtl="0" eaLnBrk="1" latinLnBrk="0" hangingPunct="1">
+        <a:defRPr sz="288" kern="1200">
           <a:solidFill>
             <a:schemeClr val="tx1"/>
           </a:solidFill>
@@ -2902,8 +2907,8 @@
           <a:cs typeface="+mn-cs"/>
         </a:defRPr>
       </a:lvl4pPr>
-      <a:lvl5pPr marL="243779" algn="l" defTabSz="121890" rtl="0" eaLnBrk="1" latinLnBrk="0" hangingPunct="1">
-        <a:defRPr sz="240" kern="1200">
+      <a:lvl5pPr marL="292608" algn="l" defTabSz="146304" rtl="0" eaLnBrk="1" latinLnBrk="0" hangingPunct="1">
+        <a:defRPr sz="288" kern="1200">
           <a:solidFill>
             <a:schemeClr val="tx1"/>
           </a:solidFill>
@@ -2912,8 +2917,8 @@
           <a:cs typeface="+mn-cs"/>
         </a:defRPr>
       </a:lvl5pPr>
-      <a:lvl6pPr marL="304724" algn="l" defTabSz="121890" rtl="0" eaLnBrk="1" latinLnBrk="0" hangingPunct="1">
-        <a:defRPr sz="240" kern="1200">
+      <a:lvl6pPr marL="365760" algn="l" defTabSz="146304" rtl="0" eaLnBrk="1" latinLnBrk="0" hangingPunct="1">
+        <a:defRPr sz="288" kern="1200">
           <a:solidFill>
             <a:schemeClr val="tx1"/>
           </a:solidFill>
@@ -2922,8 +2927,8 @@
           <a:cs typeface="+mn-cs"/>
         </a:defRPr>
       </a:lvl6pPr>
-      <a:lvl7pPr marL="365669" algn="l" defTabSz="121890" rtl="0" eaLnBrk="1" latinLnBrk="0" hangingPunct="1">
-        <a:defRPr sz="240" kern="1200">
+      <a:lvl7pPr marL="438912" algn="l" defTabSz="146304" rtl="0" eaLnBrk="1" latinLnBrk="0" hangingPunct="1">
+        <a:defRPr sz="288" kern="1200">
           <a:solidFill>
             <a:schemeClr val="tx1"/>
           </a:solidFill>
@@ -2932,8 +2937,8 @@
           <a:cs typeface="+mn-cs"/>
         </a:defRPr>
       </a:lvl7pPr>
-      <a:lvl8pPr marL="426613" algn="l" defTabSz="121890" rtl="0" eaLnBrk="1" latinLnBrk="0" hangingPunct="1">
-        <a:defRPr sz="240" kern="1200">
+      <a:lvl8pPr marL="512064" algn="l" defTabSz="146304" rtl="0" eaLnBrk="1" latinLnBrk="0" hangingPunct="1">
+        <a:defRPr sz="288" kern="1200">
           <a:solidFill>
             <a:schemeClr val="tx1"/>
           </a:solidFill>
@@ -2942,8 +2947,8 @@
           <a:cs typeface="+mn-cs"/>
         </a:defRPr>
       </a:lvl8pPr>
-      <a:lvl9pPr marL="487558" algn="l" defTabSz="121890" rtl="0" eaLnBrk="1" latinLnBrk="0" hangingPunct="1">
-        <a:defRPr sz="240" kern="1200">
+      <a:lvl9pPr marL="585216" algn="l" defTabSz="146304" rtl="0" eaLnBrk="1" latinLnBrk="0" hangingPunct="1">
+        <a:defRPr sz="288" kern="1200">
           <a:solidFill>
             <a:schemeClr val="tx1"/>
           </a:solidFill>
@@ -2988,7 +2993,7 @@
         </p:nvSpPr>
         <p:spPr>
           <a:xfrm>
-            <a:off x="0" y="57150"/>
+            <a:off x="0" y="296863"/>
             <a:ext cx="2177808" cy="800100"/>
           </a:xfrm>
           <a:prstGeom prst="rect">
@@ -3045,7 +3050,7 @@
         </p:nvSpPr>
         <p:spPr>
           <a:xfrm>
-            <a:off x="3384794" y="57150"/>
+            <a:off x="3384794" y="296863"/>
             <a:ext cx="2177808" cy="800100"/>
           </a:xfrm>
           <a:prstGeom prst="rect">
@@ -3102,8 +3107,8 @@
         </p:nvSpPr>
         <p:spPr>
           <a:xfrm>
-            <a:off x="1965960" y="-142965"/>
-            <a:ext cx="1630680" cy="1200457"/>
+            <a:off x="1965960" y="96749"/>
+            <a:ext cx="1630680" cy="1200329"/>
           </a:xfrm>
           <a:prstGeom prst="rect">
             <a:avLst/>
@@ -3118,7 +3123,7 @@
           <a:p>
             <a:pPr algn="ctr"/>
             <a:r>
-              <a:rPr lang="en-US" sz="7201" dirty="0">
+              <a:rPr lang="en-US" sz="7200" dirty="0">
                 <a:latin typeface="Bahnschrift" panose="020B0502040204020203" pitchFamily="34" charset="0"/>
               </a:rPr>
               <a:t>01</a:t>
@@ -3170,7 +3175,7 @@
         </p:nvSpPr>
         <p:spPr>
           <a:xfrm>
-            <a:off x="0" y="57150"/>
+            <a:off x="0" y="296863"/>
             <a:ext cx="2177808" cy="800100"/>
           </a:xfrm>
           <a:prstGeom prst="rect">
@@ -3227,7 +3232,7 @@
         </p:nvSpPr>
         <p:spPr>
           <a:xfrm>
-            <a:off x="3384794" y="57150"/>
+            <a:off x="3384794" y="296863"/>
             <a:ext cx="2177808" cy="800100"/>
           </a:xfrm>
           <a:prstGeom prst="rect">
@@ -3284,8 +3289,8 @@
         </p:nvSpPr>
         <p:spPr>
           <a:xfrm>
-            <a:off x="1965960" y="-142965"/>
-            <a:ext cx="1630680" cy="1200457"/>
+            <a:off x="1965960" y="96749"/>
+            <a:ext cx="1630680" cy="1200329"/>
           </a:xfrm>
           <a:prstGeom prst="rect">
             <a:avLst/>
@@ -3300,7 +3305,7 @@
           <a:p>
             <a:pPr algn="ctr"/>
             <a:r>
-              <a:rPr lang="en-US" sz="7201" dirty="0">
+              <a:rPr lang="en-US" sz="7200" dirty="0">
                 <a:latin typeface="Bahnschrift" panose="020B0502040204020203" pitchFamily="34" charset="0"/>
               </a:rPr>
               <a:t>02</a:t>
@@ -3352,7 +3357,7 @@
         </p:nvSpPr>
         <p:spPr>
           <a:xfrm>
-            <a:off x="0" y="57150"/>
+            <a:off x="0" y="296863"/>
             <a:ext cx="2177808" cy="800100"/>
           </a:xfrm>
           <a:prstGeom prst="rect">
@@ -3409,7 +3414,7 @@
         </p:nvSpPr>
         <p:spPr>
           <a:xfrm>
-            <a:off x="3384794" y="57150"/>
+            <a:off x="3384794" y="296863"/>
             <a:ext cx="2177808" cy="800100"/>
           </a:xfrm>
           <a:prstGeom prst="rect">
@@ -3466,8 +3471,8 @@
         </p:nvSpPr>
         <p:spPr>
           <a:xfrm>
-            <a:off x="1965960" y="-142965"/>
-            <a:ext cx="1630680" cy="1200457"/>
+            <a:off x="1965960" y="96749"/>
+            <a:ext cx="1630680" cy="1200329"/>
           </a:xfrm>
           <a:prstGeom prst="rect">
             <a:avLst/>
@@ -3482,7 +3487,7 @@
           <a:p>
             <a:pPr algn="ctr"/>
             <a:r>
-              <a:rPr lang="en-US" sz="7201" dirty="0">
+              <a:rPr lang="en-US" sz="7200" dirty="0">
                 <a:latin typeface="Bahnschrift" panose="020B0502040204020203" pitchFamily="34" charset="0"/>
               </a:rPr>
               <a:t>03</a:t>
@@ -3534,7 +3539,7 @@
         </p:nvSpPr>
         <p:spPr>
           <a:xfrm>
-            <a:off x="0" y="57150"/>
+            <a:off x="0" y="296863"/>
             <a:ext cx="2177808" cy="800100"/>
           </a:xfrm>
           <a:prstGeom prst="rect">
@@ -3591,7 +3596,7 @@
         </p:nvSpPr>
         <p:spPr>
           <a:xfrm>
-            <a:off x="3384794" y="57150"/>
+            <a:off x="3384794" y="296863"/>
             <a:ext cx="2177808" cy="800100"/>
           </a:xfrm>
           <a:prstGeom prst="rect">
@@ -3648,8 +3653,8 @@
         </p:nvSpPr>
         <p:spPr>
           <a:xfrm>
-            <a:off x="1965960" y="-142965"/>
-            <a:ext cx="1630680" cy="1200457"/>
+            <a:off x="1965960" y="96749"/>
+            <a:ext cx="1630680" cy="1200329"/>
           </a:xfrm>
           <a:prstGeom prst="rect">
             <a:avLst/>
@@ -3664,7 +3669,7 @@
           <a:p>
             <a:pPr algn="ctr"/>
             <a:r>
-              <a:rPr lang="en-US" sz="7201" dirty="0">
+              <a:rPr lang="en-US" sz="7200" dirty="0">
                 <a:latin typeface="Bahnschrift" panose="020B0502040204020203" pitchFamily="34" charset="0"/>
               </a:rPr>
               <a:t>04</a:t>
@@ -3716,7 +3721,7 @@
         </p:nvSpPr>
         <p:spPr>
           <a:xfrm>
-            <a:off x="0" y="57150"/>
+            <a:off x="0" y="296863"/>
             <a:ext cx="2177808" cy="800100"/>
           </a:xfrm>
           <a:prstGeom prst="rect">
@@ -3773,7 +3778,7 @@
         </p:nvSpPr>
         <p:spPr>
           <a:xfrm>
-            <a:off x="3384794" y="57150"/>
+            <a:off x="3384794" y="296863"/>
             <a:ext cx="2177808" cy="800100"/>
           </a:xfrm>
           <a:prstGeom prst="rect">
@@ -3830,8 +3835,8 @@
         </p:nvSpPr>
         <p:spPr>
           <a:xfrm>
-            <a:off x="1965960" y="-142965"/>
-            <a:ext cx="1630680" cy="1200457"/>
+            <a:off x="1965960" y="96749"/>
+            <a:ext cx="1630680" cy="1200329"/>
           </a:xfrm>
           <a:prstGeom prst="rect">
             <a:avLst/>
@@ -3846,7 +3851,7 @@
           <a:p>
             <a:pPr algn="ctr"/>
             <a:r>
-              <a:rPr lang="en-US" sz="7201" dirty="0">
+              <a:rPr lang="en-US" sz="7200" dirty="0">
                 <a:latin typeface="Bahnschrift" panose="020B0502040204020203" pitchFamily="34" charset="0"/>
               </a:rPr>
               <a:t>05</a:t>
@@ -3898,7 +3903,7 @@
         </p:nvSpPr>
         <p:spPr>
           <a:xfrm>
-            <a:off x="0" y="57150"/>
+            <a:off x="0" y="296863"/>
             <a:ext cx="2177808" cy="800100"/>
           </a:xfrm>
           <a:prstGeom prst="rect">
@@ -3955,7 +3960,7 @@
         </p:nvSpPr>
         <p:spPr>
           <a:xfrm>
-            <a:off x="3384794" y="57150"/>
+            <a:off x="3384794" y="296863"/>
             <a:ext cx="2177808" cy="800100"/>
           </a:xfrm>
           <a:prstGeom prst="rect">
@@ -4012,8 +4017,8 @@
         </p:nvSpPr>
         <p:spPr>
           <a:xfrm>
-            <a:off x="1965960" y="-142965"/>
-            <a:ext cx="1630680" cy="1200457"/>
+            <a:off x="1965960" y="96749"/>
+            <a:ext cx="1630680" cy="1200329"/>
           </a:xfrm>
           <a:prstGeom prst="rect">
             <a:avLst/>
@@ -4028,7 +4033,7 @@
           <a:p>
             <a:pPr algn="ctr"/>
             <a:r>
-              <a:rPr lang="en-US" sz="7201" dirty="0">
+              <a:rPr lang="en-US" sz="7200" dirty="0">
                 <a:latin typeface="Bahnschrift" panose="020B0502040204020203" pitchFamily="34" charset="0"/>
               </a:rPr>
               <a:t>06</a:t>
@@ -4080,7 +4085,7 @@
         </p:nvSpPr>
         <p:spPr>
           <a:xfrm>
-            <a:off x="0" y="57150"/>
+            <a:off x="0" y="296863"/>
             <a:ext cx="2177808" cy="800100"/>
           </a:xfrm>
           <a:prstGeom prst="rect">
@@ -4137,7 +4142,7 @@
         </p:nvSpPr>
         <p:spPr>
           <a:xfrm>
-            <a:off x="3384794" y="57150"/>
+            <a:off x="3384794" y="296863"/>
             <a:ext cx="2177808" cy="800100"/>
           </a:xfrm>
           <a:prstGeom prst="rect">
@@ -4194,8 +4199,8 @@
         </p:nvSpPr>
         <p:spPr>
           <a:xfrm>
-            <a:off x="1965960" y="-142965"/>
-            <a:ext cx="1630680" cy="1200457"/>
+            <a:off x="1965960" y="96749"/>
+            <a:ext cx="1630680" cy="1200329"/>
           </a:xfrm>
           <a:prstGeom prst="rect">
             <a:avLst/>
@@ -4210,7 +4215,7 @@
           <a:p>
             <a:pPr algn="ctr"/>
             <a:r>
-              <a:rPr lang="en-US" sz="7201" dirty="0">
+              <a:rPr lang="en-US" sz="7200" dirty="0">
                 <a:latin typeface="Bahnschrift" panose="020B0502040204020203" pitchFamily="34" charset="0"/>
               </a:rPr>
               <a:t>07</a:t>

</xml_diff>